<commit_message>
Update Diego Parra - IEG Interview.pptx
</commit_message>
<xml_diff>
--- a/3_Outputs/Diego Parra - IEG Interview.pptx
+++ b/3_Outputs/Diego Parra - IEG Interview.pptx
@@ -5,7 +5,7 @@
     <p:sldMasterId id="2147483648" r:id="rId1"/>
   </p:sldMasterIdLst>
   <p:notesMasterIdLst>
-    <p:notesMasterId r:id="rId17"/>
+    <p:notesMasterId r:id="rId18"/>
   </p:notesMasterIdLst>
   <p:sldIdLst>
     <p:sldId id="268" r:id="rId2"/>
@@ -19,10 +19,11 @@
     <p:sldId id="261" r:id="rId10"/>
     <p:sldId id="262" r:id="rId11"/>
     <p:sldId id="263" r:id="rId12"/>
-    <p:sldId id="265" r:id="rId13"/>
-    <p:sldId id="267" r:id="rId14"/>
-    <p:sldId id="266" r:id="rId15"/>
-    <p:sldId id="270" r:id="rId16"/>
+    <p:sldId id="274" r:id="rId13"/>
+    <p:sldId id="265" r:id="rId14"/>
+    <p:sldId id="267" r:id="rId15"/>
+    <p:sldId id="266" r:id="rId16"/>
+    <p:sldId id="270" r:id="rId17"/>
   </p:sldIdLst>
   <p:sldSz cx="12192000" cy="6858000"/>
   <p:notesSz cx="6858000" cy="9144000"/>
@@ -132,7 +133,7 @@
 <file path=ppt/revisionInfo.xml><?xml version="1.0" encoding="utf-8"?>
 <p1510:revInfo xmlns:a="http://schemas.openxmlformats.org/drawingml/2006/main" xmlns:r="http://schemas.openxmlformats.org/officeDocument/2006/relationships" xmlns:p1510="http://schemas.microsoft.com/office/powerpoint/2015/10/main">
   <p1510:revLst>
-    <p1510:client id="{2A51921F-420C-4CA8-8E41-8867C06D0C4C}" v="442" dt="2025-06-24T04:45:13.737"/>
+    <p1510:client id="{2A51921F-420C-4CA8-8E41-8867C06D0C4C}" v="443" dt="2025-06-24T13:27:47.680"/>
   </p1510:revLst>
 </p1510:revInfo>
 </file>
@@ -142,7 +143,7 @@
   <pc:docChgLst>
     <pc:chgData name="Diego Alejandro Parra Alvarez" userId="5a1915da-c8a4-48ce-8a21-180b3b90c912" providerId="ADAL" clId="{2A51921F-420C-4CA8-8E41-8867C06D0C4C}"/>
     <pc:docChg chg="undo redo custSel addSld delSld modSld">
-      <pc:chgData name="Diego Alejandro Parra Alvarez" userId="5a1915da-c8a4-48ce-8a21-180b3b90c912" providerId="ADAL" clId="{2A51921F-420C-4CA8-8E41-8867C06D0C4C}" dt="2025-06-24T04:46:25.180" v="1959" actId="403"/>
+      <pc:chgData name="Diego Alejandro Parra Alvarez" userId="5a1915da-c8a4-48ce-8a21-180b3b90c912" providerId="ADAL" clId="{2A51921F-420C-4CA8-8E41-8867C06D0C4C}" dt="2025-06-24T13:43:19.781" v="2018" actId="20577"/>
       <pc:docMkLst>
         <pc:docMk/>
       </pc:docMkLst>
@@ -462,7 +463,7 @@
         </pc:picChg>
       </pc:sldChg>
       <pc:sldChg chg="addSp delSp modSp mod">
-        <pc:chgData name="Diego Alejandro Parra Alvarez" userId="5a1915da-c8a4-48ce-8a21-180b3b90c912" providerId="ADAL" clId="{2A51921F-420C-4CA8-8E41-8867C06D0C4C}" dt="2025-06-24T04:18:51.118" v="1635" actId="20577"/>
+        <pc:chgData name="Diego Alejandro Parra Alvarez" userId="5a1915da-c8a4-48ce-8a21-180b3b90c912" providerId="ADAL" clId="{2A51921F-420C-4CA8-8E41-8867C06D0C4C}" dt="2025-06-24T13:43:19.781" v="2018" actId="20577"/>
         <pc:sldMkLst>
           <pc:docMk/>
           <pc:sldMk cId="1855536933" sldId="263"/>
@@ -484,7 +485,7 @@
           </ac:spMkLst>
         </pc:spChg>
         <pc:spChg chg="add mod">
-          <ac:chgData name="Diego Alejandro Parra Alvarez" userId="5a1915da-c8a4-48ce-8a21-180b3b90c912" providerId="ADAL" clId="{2A51921F-420C-4CA8-8E41-8867C06D0C4C}" dt="2025-06-24T04:18:51.118" v="1635" actId="20577"/>
+          <ac:chgData name="Diego Alejandro Parra Alvarez" userId="5a1915da-c8a4-48ce-8a21-180b3b90c912" providerId="ADAL" clId="{2A51921F-420C-4CA8-8E41-8867C06D0C4C}" dt="2025-06-24T13:32:26.141" v="1974" actId="1076"/>
           <ac:spMkLst>
             <pc:docMk/>
             <pc:sldMk cId="1855536933" sldId="263"/>
@@ -492,7 +493,7 @@
           </ac:spMkLst>
         </pc:spChg>
         <pc:spChg chg="add mod">
-          <ac:chgData name="Diego Alejandro Parra Alvarez" userId="5a1915da-c8a4-48ce-8a21-180b3b90c912" providerId="ADAL" clId="{2A51921F-420C-4CA8-8E41-8867C06D0C4C}" dt="2025-06-24T04:18:20.987" v="1616" actId="1076"/>
+          <ac:chgData name="Diego Alejandro Parra Alvarez" userId="5a1915da-c8a4-48ce-8a21-180b3b90c912" providerId="ADAL" clId="{2A51921F-420C-4CA8-8E41-8867C06D0C4C}" dt="2025-06-24T13:41:57.727" v="1998" actId="20577"/>
           <ac:spMkLst>
             <pc:docMk/>
             <pc:sldMk cId="1855536933" sldId="263"/>
@@ -500,15 +501,31 @@
           </ac:spMkLst>
         </pc:spChg>
         <pc:spChg chg="add mod">
-          <ac:chgData name="Diego Alejandro Parra Alvarez" userId="5a1915da-c8a4-48ce-8a21-180b3b90c912" providerId="ADAL" clId="{2A51921F-420C-4CA8-8E41-8867C06D0C4C}" dt="2025-06-24T04:18:26.391" v="1617" actId="1076"/>
+          <ac:chgData name="Diego Alejandro Parra Alvarez" userId="5a1915da-c8a4-48ce-8a21-180b3b90c912" providerId="ADAL" clId="{2A51921F-420C-4CA8-8E41-8867C06D0C4C}" dt="2025-06-24T13:43:19.781" v="2018" actId="20577"/>
           <ac:spMkLst>
             <pc:docMk/>
             <pc:sldMk cId="1855536933" sldId="263"/>
             <ac:spMk id="10" creationId="{F73A4916-454F-0E57-02EF-D6E231EBCEA4}"/>
           </ac:spMkLst>
         </pc:spChg>
-        <pc:picChg chg="mod">
-          <ac:chgData name="Diego Alejandro Parra Alvarez" userId="5a1915da-c8a4-48ce-8a21-180b3b90c912" providerId="ADAL" clId="{2A51921F-420C-4CA8-8E41-8867C06D0C4C}" dt="2025-06-24T04:18:26.391" v="1617" actId="1076"/>
+        <pc:picChg chg="add del mod">
+          <ac:chgData name="Diego Alejandro Parra Alvarez" userId="5a1915da-c8a4-48ce-8a21-180b3b90c912" providerId="ADAL" clId="{2A51921F-420C-4CA8-8E41-8867C06D0C4C}" dt="2025-06-24T13:34:41.463" v="1985" actId="478"/>
+          <ac:picMkLst>
+            <pc:docMk/>
+            <pc:sldMk cId="1855536933" sldId="263"/>
+            <ac:picMk id="3" creationId="{5FB5DF3D-9CBE-1360-9F98-6BB181F06712}"/>
+          </ac:picMkLst>
+        </pc:picChg>
+        <pc:picChg chg="add mod">
+          <ac:chgData name="Diego Alejandro Parra Alvarez" userId="5a1915da-c8a4-48ce-8a21-180b3b90c912" providerId="ADAL" clId="{2A51921F-420C-4CA8-8E41-8867C06D0C4C}" dt="2025-06-24T13:41:41.431" v="1991" actId="1076"/>
+          <ac:picMkLst>
+            <pc:docMk/>
+            <pc:sldMk cId="1855536933" sldId="263"/>
+            <ac:picMk id="7" creationId="{E398ECCF-54DC-9BA4-79D9-CBF4A0386B86}"/>
+          </ac:picMkLst>
+        </pc:picChg>
+        <pc:picChg chg="del mod">
+          <ac:chgData name="Diego Alejandro Parra Alvarez" userId="5a1915da-c8a4-48ce-8a21-180b3b90c912" providerId="ADAL" clId="{2A51921F-420C-4CA8-8E41-8867C06D0C4C}" dt="2025-06-24T13:27:55.458" v="1965" actId="478"/>
           <ac:picMkLst>
             <pc:docMk/>
             <pc:sldMk cId="1855536933" sldId="263"/>
@@ -572,7 +589,7 @@
         </pc:picChg>
       </pc:sldChg>
       <pc:sldChg chg="addSp delSp modSp mod">
-        <pc:chgData name="Diego Alejandro Parra Alvarez" userId="5a1915da-c8a4-48ce-8a21-180b3b90c912" providerId="ADAL" clId="{2A51921F-420C-4CA8-8E41-8867C06D0C4C}" dt="2025-06-24T04:22:02.060" v="1724" actId="1076"/>
+        <pc:chgData name="Diego Alejandro Parra Alvarez" userId="5a1915da-c8a4-48ce-8a21-180b3b90c912" providerId="ADAL" clId="{2A51921F-420C-4CA8-8E41-8867C06D0C4C}" dt="2025-06-24T13:22:20.476" v="1963"/>
         <pc:sldMkLst>
           <pc:docMk/>
           <pc:sldMk cId="3048902972" sldId="265"/>
@@ -586,7 +603,7 @@
           </ac:spMkLst>
         </pc:spChg>
         <pc:spChg chg="add mod">
-          <ac:chgData name="Diego Alejandro Parra Alvarez" userId="5a1915da-c8a4-48ce-8a21-180b3b90c912" providerId="ADAL" clId="{2A51921F-420C-4CA8-8E41-8867C06D0C4C}" dt="2025-06-24T04:20:36.299" v="1695" actId="1076"/>
+          <ac:chgData name="Diego Alejandro Parra Alvarez" userId="5a1915da-c8a4-48ce-8a21-180b3b90c912" providerId="ADAL" clId="{2A51921F-420C-4CA8-8E41-8867C06D0C4C}" dt="2025-06-24T13:22:20.476" v="1963"/>
           <ac:spMkLst>
             <pc:docMk/>
             <pc:sldMk cId="3048902972" sldId="265"/>
@@ -932,13 +949,13 @@
         </pc:picChg>
       </pc:sldChg>
       <pc:sldChg chg="addSp modSp add mod">
-        <pc:chgData name="Diego Alejandro Parra Alvarez" userId="5a1915da-c8a4-48ce-8a21-180b3b90c912" providerId="ADAL" clId="{2A51921F-420C-4CA8-8E41-8867C06D0C4C}" dt="2025-06-24T04:45:20.920" v="1958" actId="113"/>
+        <pc:chgData name="Diego Alejandro Parra Alvarez" userId="5a1915da-c8a4-48ce-8a21-180b3b90c912" providerId="ADAL" clId="{2A51921F-420C-4CA8-8E41-8867C06D0C4C}" dt="2025-06-24T04:51:57.068" v="1960" actId="20577"/>
         <pc:sldMkLst>
           <pc:docMk/>
           <pc:sldMk cId="2924612036" sldId="272"/>
         </pc:sldMkLst>
         <pc:spChg chg="add mod">
-          <ac:chgData name="Diego Alejandro Parra Alvarez" userId="5a1915da-c8a4-48ce-8a21-180b3b90c912" providerId="ADAL" clId="{2A51921F-420C-4CA8-8E41-8867C06D0C4C}" dt="2025-06-24T04:44:53.713" v="1954" actId="1076"/>
+          <ac:chgData name="Diego Alejandro Parra Alvarez" userId="5a1915da-c8a4-48ce-8a21-180b3b90c912" providerId="ADAL" clId="{2A51921F-420C-4CA8-8E41-8867C06D0C4C}" dt="2025-06-24T04:51:57.068" v="1960" actId="20577"/>
           <ac:spMkLst>
             <pc:docMk/>
             <pc:sldMk cId="2924612036" sldId="272"/>
@@ -1032,6 +1049,13 @@
             <ac:picMk id="15" creationId="{9F43B795-995A-8C7A-CD6A-DEEB51F36B6F}"/>
           </ac:picMkLst>
         </pc:picChg>
+      </pc:sldChg>
+      <pc:sldChg chg="add">
+        <pc:chgData name="Diego Alejandro Parra Alvarez" userId="5a1915da-c8a4-48ce-8a21-180b3b90c912" providerId="ADAL" clId="{2A51921F-420C-4CA8-8E41-8867C06D0C4C}" dt="2025-06-24T13:27:47.675" v="1964"/>
+        <pc:sldMkLst>
+          <pc:docMk/>
+          <pc:sldMk cId="1270150859" sldId="274"/>
+        </pc:sldMkLst>
       </pc:sldChg>
     </pc:docChg>
   </pc:docChgLst>
@@ -5355,12 +5379,214 @@
           <a:chExt cx="0" cy="0"/>
         </a:xfrm>
       </p:grpSpPr>
+      <p:sp>
+        <p:nvSpPr>
+          <p:cNvPr id="10" name="TextBox 9">
+            <a:extLst>
+              <a:ext uri="{FF2B5EF4-FFF2-40B4-BE49-F238E27FC236}">
+                <a16:creationId xmlns:a16="http://schemas.microsoft.com/office/drawing/2014/main" id="{F73A4916-454F-0E57-02EF-D6E231EBCEA4}"/>
+              </a:ext>
+            </a:extLst>
+          </p:cNvPr>
+          <p:cNvSpPr txBox="1"/>
+          <p:nvPr/>
+        </p:nvSpPr>
+        <p:spPr>
+          <a:xfrm>
+            <a:off x="1628914" y="2097775"/>
+            <a:ext cx="8934172" cy="307777"/>
+          </a:xfrm>
+          <a:prstGeom prst="rect">
+            <a:avLst/>
+          </a:prstGeom>
+          <a:noFill/>
+        </p:spPr>
+        <p:txBody>
+          <a:bodyPr wrap="square" rtlCol="0">
+            <a:spAutoFit/>
+          </a:bodyPr>
+          <a:lstStyle/>
+          <a:p>
+            <a:pPr algn="ctr"/>
+            <a:r>
+              <a:rPr lang="en-US" sz="1400" b="1" dirty="0">
+                <a:solidFill>
+                  <a:srgbClr val="002060"/>
+                </a:solidFill>
+              </a:rPr>
+              <a:t>Example. </a:t>
+            </a:r>
+            <a:r>
+              <a:rPr lang="en-US" sz="1400" b="1" dirty="0"/>
+              <a:t>TEQIP III (India, 2016)</a:t>
+            </a:r>
+          </a:p>
+        </p:txBody>
+      </p:sp>
+      <p:sp>
+        <p:nvSpPr>
+          <p:cNvPr id="4" name="TextBox 3">
+            <a:extLst>
+              <a:ext uri="{FF2B5EF4-FFF2-40B4-BE49-F238E27FC236}">
+                <a16:creationId xmlns:a16="http://schemas.microsoft.com/office/drawing/2014/main" id="{40B3F2E5-5B71-6090-D2E7-F4C1B184CD7B}"/>
+              </a:ext>
+            </a:extLst>
+          </p:cNvPr>
+          <p:cNvSpPr txBox="1"/>
+          <p:nvPr/>
+        </p:nvSpPr>
+        <p:spPr>
+          <a:xfrm>
+            <a:off x="374707" y="688248"/>
+            <a:ext cx="10730791" cy="461665"/>
+          </a:xfrm>
+          <a:prstGeom prst="rect">
+            <a:avLst/>
+          </a:prstGeom>
+          <a:noFill/>
+        </p:spPr>
+        <p:txBody>
+          <a:bodyPr wrap="square" rtlCol="0">
+            <a:spAutoFit/>
+          </a:bodyPr>
+          <a:lstStyle/>
+          <a:p>
+            <a:pPr algn="just"/>
+            <a:r>
+              <a:rPr lang="en-US" sz="2400" b="1" dirty="0">
+                <a:solidFill>
+                  <a:srgbClr val="002060"/>
+                </a:solidFill>
+              </a:rPr>
+              <a:t>Sentiment Analysis</a:t>
+            </a:r>
+            <a:endParaRPr lang="en-US" sz="2400" dirty="0">
+              <a:solidFill>
+                <a:srgbClr val="002060"/>
+              </a:solidFill>
+            </a:endParaRPr>
+          </a:p>
+        </p:txBody>
+      </p:sp>
+      <p:sp>
+        <p:nvSpPr>
+          <p:cNvPr id="5" name="TextBox 4">
+            <a:extLst>
+              <a:ext uri="{FF2B5EF4-FFF2-40B4-BE49-F238E27FC236}">
+                <a16:creationId xmlns:a16="http://schemas.microsoft.com/office/drawing/2014/main" id="{FBEF0F11-3520-3350-74C9-E090F8FE3682}"/>
+              </a:ext>
+            </a:extLst>
+          </p:cNvPr>
+          <p:cNvSpPr txBox="1"/>
+          <p:nvPr/>
+        </p:nvSpPr>
+        <p:spPr>
+          <a:xfrm>
+            <a:off x="390529" y="1249270"/>
+            <a:ext cx="11410941" cy="646331"/>
+          </a:xfrm>
+          <a:prstGeom prst="rect">
+            <a:avLst/>
+          </a:prstGeom>
+          <a:noFill/>
+        </p:spPr>
+        <p:txBody>
+          <a:bodyPr wrap="square" rtlCol="0">
+            <a:spAutoFit/>
+          </a:bodyPr>
+          <a:lstStyle/>
+          <a:p>
+            <a:pPr marL="285750" indent="-285750" algn="just">
+              <a:buFont typeface="Arial" panose="020B0604020202020204" pitchFamily="34" charset="0"/>
+              <a:buChar char="•"/>
+            </a:pPr>
+            <a:r>
+              <a:rPr lang="en-US" dirty="0"/>
+              <a:t>Now, I extracted full texts from IEG evaluation PDFs and used regular expressions to isolate key sections: M&amp;E Design, Implementation, Utilization, and Lessons. </a:t>
+            </a:r>
+            <a:r>
+              <a:rPr lang="en-US" b="1" dirty="0"/>
+              <a:t>Sentiment analysis </a:t>
+            </a:r>
+            <a:r>
+              <a:rPr lang="en-US" dirty="0"/>
+              <a:t>was then applied. </a:t>
+            </a:r>
+          </a:p>
+        </p:txBody>
+      </p:sp>
+      <p:pic>
+        <p:nvPicPr>
+          <p:cNvPr id="7" name="Picture 6">
+            <a:extLst>
+              <a:ext uri="{FF2B5EF4-FFF2-40B4-BE49-F238E27FC236}">
+                <a16:creationId xmlns:a16="http://schemas.microsoft.com/office/drawing/2014/main" id="{E398ECCF-54DC-9BA4-79D9-CBF4A0386B86}"/>
+              </a:ext>
+            </a:extLst>
+          </p:cNvPr>
+          <p:cNvPicPr>
+            <a:picLocks noChangeAspect="1"/>
+          </p:cNvPicPr>
+          <p:nvPr/>
+        </p:nvPicPr>
+        <p:blipFill>
+          <a:blip r:embed="rId2"/>
+          <a:stretch>
+            <a:fillRect/>
+          </a:stretch>
+        </p:blipFill>
+        <p:spPr>
+          <a:xfrm>
+            <a:off x="3173184" y="2405552"/>
+            <a:ext cx="5845630" cy="3523961"/>
+          </a:xfrm>
+          <a:prstGeom prst="rect">
+            <a:avLst/>
+          </a:prstGeom>
+        </p:spPr>
+      </p:pic>
+    </p:spTree>
+    <p:extLst>
+      <p:ext uri="{BB962C8B-B14F-4D97-AF65-F5344CB8AC3E}">
+        <p14:creationId xmlns:p14="http://schemas.microsoft.com/office/powerpoint/2010/main" val="1855536933"/>
+      </p:ext>
+    </p:extLst>
+  </p:cSld>
+  <p:clrMapOvr>
+    <a:masterClrMapping/>
+  </p:clrMapOvr>
+</p:sld>
+</file>
+
+<file path=ppt/slides/slide12.xml><?xml version="1.0" encoding="utf-8"?>
+<p:sld xmlns:a="http://schemas.openxmlformats.org/drawingml/2006/main" xmlns:r="http://schemas.openxmlformats.org/officeDocument/2006/relationships" xmlns:p="http://schemas.openxmlformats.org/presentationml/2006/main">
+  <p:cSld>
+    <p:spTree>
+      <p:nvGrpSpPr>
+        <p:cNvPr id="1" name="">
+          <a:extLst>
+            <a:ext uri="{FF2B5EF4-FFF2-40B4-BE49-F238E27FC236}">
+              <a16:creationId xmlns:a16="http://schemas.microsoft.com/office/drawing/2014/main" id="{38C4DDDA-4748-5FD3-E748-43B6202A43FB}"/>
+            </a:ext>
+          </a:extLst>
+        </p:cNvPr>
+        <p:cNvGrpSpPr/>
+        <p:nvPr/>
+      </p:nvGrpSpPr>
+      <p:grpSpPr>
+        <a:xfrm>
+          <a:off x="0" y="0"/>
+          <a:ext cx="0" cy="0"/>
+          <a:chOff x="0" y="0"/>
+          <a:chExt cx="0" cy="0"/>
+        </a:xfrm>
+      </p:grpSpPr>
       <p:pic>
         <p:nvPicPr>
           <p:cNvPr id="9" name="Picture 8">
             <a:extLst>
               <a:ext uri="{FF2B5EF4-FFF2-40B4-BE49-F238E27FC236}">
-                <a16:creationId xmlns:a16="http://schemas.microsoft.com/office/drawing/2014/main" id="{DAEA3742-6BA7-6EE0-1B64-D1E882B6C43A}"/>
+                <a16:creationId xmlns:a16="http://schemas.microsoft.com/office/drawing/2014/main" id="{8660C3CA-0DBD-B8A2-8C57-64322A70AA78}"/>
               </a:ext>
             </a:extLst>
           </p:cNvPr>
@@ -5390,7 +5616,7 @@
           <p:cNvPr id="10" name="TextBox 9">
             <a:extLst>
               <a:ext uri="{FF2B5EF4-FFF2-40B4-BE49-F238E27FC236}">
-                <a16:creationId xmlns:a16="http://schemas.microsoft.com/office/drawing/2014/main" id="{F73A4916-454F-0E57-02EF-D6E231EBCEA4}"/>
+                <a16:creationId xmlns:a16="http://schemas.microsoft.com/office/drawing/2014/main" id="{1218E6BD-93FE-B9A7-25C7-035BC876E8E5}"/>
               </a:ext>
             </a:extLst>
           </p:cNvPr>
@@ -5434,7 +5660,7 @@
           <p:cNvPr id="4" name="TextBox 3">
             <a:extLst>
               <a:ext uri="{FF2B5EF4-FFF2-40B4-BE49-F238E27FC236}">
-                <a16:creationId xmlns:a16="http://schemas.microsoft.com/office/drawing/2014/main" id="{40B3F2E5-5B71-6090-D2E7-F4C1B184CD7B}"/>
+                <a16:creationId xmlns:a16="http://schemas.microsoft.com/office/drawing/2014/main" id="{63DDBBAF-B124-3229-7B1C-3E5C22FDFD03}"/>
               </a:ext>
             </a:extLst>
           </p:cNvPr>
@@ -5479,7 +5705,7 @@
           <p:cNvPr id="5" name="TextBox 4">
             <a:extLst>
               <a:ext uri="{FF2B5EF4-FFF2-40B4-BE49-F238E27FC236}">
-                <a16:creationId xmlns:a16="http://schemas.microsoft.com/office/drawing/2014/main" id="{FBEF0F11-3520-3350-74C9-E090F8FE3682}"/>
+                <a16:creationId xmlns:a16="http://schemas.microsoft.com/office/drawing/2014/main" id="{5E6983AA-7D2F-5F20-2626-3B21A83F639D}"/>
               </a:ext>
             </a:extLst>
           </p:cNvPr>
@@ -5541,7 +5767,7 @@
     </p:spTree>
     <p:extLst>
       <p:ext uri="{BB962C8B-B14F-4D97-AF65-F5344CB8AC3E}">
-        <p14:creationId xmlns:p14="http://schemas.microsoft.com/office/powerpoint/2010/main" val="1855536933"/>
+        <p14:creationId xmlns:p14="http://schemas.microsoft.com/office/powerpoint/2010/main" val="1270150859"/>
       </p:ext>
     </p:extLst>
   </p:cSld>
@@ -5551,7 +5777,7 @@
 </p:sld>
 </file>
 
-<file path=ppt/slides/slide12.xml><?xml version="1.0" encoding="utf-8"?>
+<file path=ppt/slides/slide13.xml><?xml version="1.0" encoding="utf-8"?>
 <p:sld xmlns:a="http://schemas.openxmlformats.org/drawingml/2006/main" xmlns:r="http://schemas.openxmlformats.org/officeDocument/2006/relationships" xmlns:p="http://schemas.openxmlformats.org/presentationml/2006/main">
   <p:cSld>
     <p:spTree>
@@ -5683,7 +5909,7 @@
                   <a:srgbClr val="002060"/>
                 </a:solidFill>
               </a:rPr>
-              <a:t>ML implementation including sentiment analysis</a:t>
+              <a:t>ML Implementation after Incorporating Sentiment Analysis</a:t>
             </a:r>
             <a:endParaRPr lang="en-US" sz="2400" dirty="0">
               <a:solidFill>
@@ -5831,7 +6057,7 @@
 </p:sld>
 </file>
 
-<file path=ppt/slides/slide13.xml><?xml version="1.0" encoding="utf-8"?>
+<file path=ppt/slides/slide14.xml><?xml version="1.0" encoding="utf-8"?>
 <p:sld xmlns:a="http://schemas.openxmlformats.org/drawingml/2006/main" xmlns:r="http://schemas.openxmlformats.org/officeDocument/2006/relationships" xmlns:p="http://schemas.openxmlformats.org/presentationml/2006/main">
   <p:cSld>
     <p:spTree>
@@ -6050,7 +6276,7 @@
 </p:sld>
 </file>
 
-<file path=ppt/slides/slide14.xml><?xml version="1.0" encoding="utf-8"?>
+<file path=ppt/slides/slide15.xml><?xml version="1.0" encoding="utf-8"?>
 <p:sld xmlns:a="http://schemas.openxmlformats.org/drawingml/2006/main" xmlns:r="http://schemas.openxmlformats.org/officeDocument/2006/relationships" xmlns:p="http://schemas.openxmlformats.org/presentationml/2006/main">
   <p:cSld>
     <p:spTree>
@@ -6325,7 +6551,7 @@
 </p:sld>
 </file>
 
-<file path=ppt/slides/slide15.xml><?xml version="1.0" encoding="utf-8"?>
+<file path=ppt/slides/slide16.xml><?xml version="1.0" encoding="utf-8"?>
 <p:sld xmlns:a="http://schemas.openxmlformats.org/drawingml/2006/main" xmlns:r="http://schemas.openxmlformats.org/officeDocument/2006/relationships" xmlns:p="http://schemas.openxmlformats.org/presentationml/2006/main">
   <p:cSld>
     <p:spTree>
@@ -6769,7 +6995,7 @@
                   <a:srgbClr val="002060"/>
                 </a:solidFill>
               </a:rPr>
-              <a:t>GitHub repository for analysis reproducibility</a:t>
+              <a:t>GitHub repository for reproducibility</a:t>
             </a:r>
             <a:endParaRPr lang="en-US" sz="1400" b="1" dirty="0"/>
           </a:p>

</xml_diff>